<commit_message>
merged input from David
</commit_message>
<xml_diff>
--- a/122/NMOP/wt508-yang-messag-broker-integration-comparisonn.pptx
+++ b/122/NMOP/wt508-yang-messag-broker-integration-comparisonn.pptx
@@ -1030,7 +1030,7 @@
           <a:p>
             <a:fld id="{E5E705E9-673F-4AC4-B29E-A7B26F3B8523}" type="datetimeFigureOut">
               <a:rPr lang="de-CH" smtClean="0"/>
-              <a:t>22.02.2025</a:t>
+              <a:t>24.02.2025</a:t>
             </a:fld>
             <a:endParaRPr lang="de-CH"/>
           </a:p>
@@ -2035,7 +2035,7 @@
           <a:p>
             <a:fld id="{9E9B238C-2335-4007-98C9-471C02CC43B6}" type="datetimeFigureOut">
               <a:rPr lang="de-CH" smtClean="0"/>
-              <a:t>22.02.2025</a:t>
+              <a:t>24.02.2025</a:t>
             </a:fld>
             <a:endParaRPr lang="de-CH"/>
           </a:p>
@@ -2235,7 +2235,7 @@
           <a:p>
             <a:fld id="{9E9B238C-2335-4007-98C9-471C02CC43B6}" type="datetimeFigureOut">
               <a:rPr lang="de-CH" smtClean="0"/>
-              <a:t>22.02.2025</a:t>
+              <a:t>24.02.2025</a:t>
             </a:fld>
             <a:endParaRPr lang="de-CH"/>
           </a:p>
@@ -2445,7 +2445,7 @@
           <a:p>
             <a:fld id="{9E9B238C-2335-4007-98C9-471C02CC43B6}" type="datetimeFigureOut">
               <a:rPr lang="de-CH" smtClean="0"/>
-              <a:t>22.02.2025</a:t>
+              <a:t>24.02.2025</a:t>
             </a:fld>
             <a:endParaRPr lang="de-CH"/>
           </a:p>
@@ -2874,7 +2874,7 @@
           <a:p>
             <a:fld id="{9E9B238C-2335-4007-98C9-471C02CC43B6}" type="datetimeFigureOut">
               <a:rPr lang="de-CH" smtClean="0"/>
-              <a:t>22.02.2025</a:t>
+              <a:t>24.02.2025</a:t>
             </a:fld>
             <a:endParaRPr lang="de-CH"/>
           </a:p>
@@ -3150,7 +3150,7 @@
           <a:p>
             <a:fld id="{9E9B238C-2335-4007-98C9-471C02CC43B6}" type="datetimeFigureOut">
               <a:rPr lang="de-CH" smtClean="0"/>
-              <a:t>22.02.2025</a:t>
+              <a:t>24.02.2025</a:t>
             </a:fld>
             <a:endParaRPr lang="de-CH"/>
           </a:p>
@@ -3418,7 +3418,7 @@
           <a:p>
             <a:fld id="{9E9B238C-2335-4007-98C9-471C02CC43B6}" type="datetimeFigureOut">
               <a:rPr lang="de-CH" smtClean="0"/>
-              <a:t>22.02.2025</a:t>
+              <a:t>24.02.2025</a:t>
             </a:fld>
             <a:endParaRPr lang="de-CH"/>
           </a:p>
@@ -3833,7 +3833,7 @@
           <a:p>
             <a:fld id="{9E9B238C-2335-4007-98C9-471C02CC43B6}" type="datetimeFigureOut">
               <a:rPr lang="de-CH" smtClean="0"/>
-              <a:t>22.02.2025</a:t>
+              <a:t>24.02.2025</a:t>
             </a:fld>
             <a:endParaRPr lang="de-CH"/>
           </a:p>
@@ -3975,7 +3975,7 @@
           <a:p>
             <a:fld id="{9E9B238C-2335-4007-98C9-471C02CC43B6}" type="datetimeFigureOut">
               <a:rPr lang="de-CH" smtClean="0"/>
-              <a:t>22.02.2025</a:t>
+              <a:t>24.02.2025</a:t>
             </a:fld>
             <a:endParaRPr lang="de-CH"/>
           </a:p>
@@ -4088,7 +4088,7 @@
           <a:p>
             <a:fld id="{9E9B238C-2335-4007-98C9-471C02CC43B6}" type="datetimeFigureOut">
               <a:rPr lang="de-CH" smtClean="0"/>
-              <a:t>22.02.2025</a:t>
+              <a:t>24.02.2025</a:t>
             </a:fld>
             <a:endParaRPr lang="de-CH"/>
           </a:p>
@@ -4401,7 +4401,7 @@
           <a:p>
             <a:fld id="{9E9B238C-2335-4007-98C9-471C02CC43B6}" type="datetimeFigureOut">
               <a:rPr lang="de-CH" smtClean="0"/>
-              <a:t>22.02.2025</a:t>
+              <a:t>24.02.2025</a:t>
             </a:fld>
             <a:endParaRPr lang="de-CH"/>
           </a:p>
@@ -4690,7 +4690,7 @@
           <a:p>
             <a:fld id="{9E9B238C-2335-4007-98C9-471C02CC43B6}" type="datetimeFigureOut">
               <a:rPr lang="de-CH" smtClean="0"/>
-              <a:t>22.02.2025</a:t>
+              <a:t>24.02.2025</a:t>
             </a:fld>
             <a:endParaRPr lang="de-CH"/>
           </a:p>
@@ -4933,7 +4933,7 @@
           <a:p>
             <a:fld id="{9E9B238C-2335-4007-98C9-471C02CC43B6}" type="datetimeFigureOut">
               <a:rPr lang="de-CH" smtClean="0"/>
-              <a:t>22.02.2025</a:t>
+              <a:t>24.02.2025</a:t>
             </a:fld>
             <a:endParaRPr lang="de-CH"/>
           </a:p>
@@ -7129,7 +7129,7 @@
             </a:pPr>
             <a:r>
               <a:rPr lang="en-US" dirty="0"/>
-              <a:t>Exportability of schema and schema tree</a:t>
+              <a:t>Accessibility of schema and schema tree</a:t>
             </a:r>
             <a:br>
               <a:rPr lang="en-US" dirty="0"/>
@@ -7148,7 +7148,7 @@
                   <a:srgbClr val="FF0000"/>
                 </a:solidFill>
               </a:rPr>
-              <a:t>Data Collection Automation</a:t>
+              <a:t>Data Processing Automation</a:t>
             </a:r>
             <a:r>
               <a:rPr lang="en-US" dirty="0">
@@ -7156,7 +7156,7 @@
                   <a:srgbClr val="FF0000"/>
                 </a:solidFill>
               </a:rPr>
-              <a:t>: Schema and dependencies needs to be obtainable from publisher</a:t>
+              <a:t>: Schema and dependencies needs to be obtainable from publisher and schema registry</a:t>
             </a:r>
           </a:p>
           <a:p>
@@ -7610,7 +7610,7 @@
                   <a:srgbClr val="FF0000"/>
                 </a:solidFill>
               </a:rPr>
-              <a:t>management plane, IPFIX forwarding plane, BMP control plane.</a:t>
+              <a:t>management plane, IPFIX forwarding plane, BMP control plane. Not only applies to access but also to a broader IP domain including edge.</a:t>
             </a:r>
             <a:br>
               <a:rPr lang="en-US" dirty="0">
@@ -7621,8 +7621,233 @@
             </a:br>
             <a:r>
               <a:rPr lang="en-US" dirty="0"/>
-              <a:t>--&gt; SIMAP, Knowledge Graph, Network Observability, Network Anomaly Detection</a:t>
-            </a:r>
+              <a:t>--&gt; At BBF: Network Trend Analysis, Proactive Assurance, Site/Node/Area Survey, Pre-Qualification, Zero Touch Provisioning, Intensive Care, Trouble-Shooting, Line re-Profiling, Directed data retrieval, Service activation and change, Proactive change on severe degrade/robustness/ rate improvement</a:t>
+            </a:r>
+            <a:r>
+              <a:rPr lang="en-US"/>
+              <a:t>, Claim </a:t>
+            </a:r>
+            <a:r>
+              <a:rPr lang="en-US" dirty="0"/>
+              <a:t>based change, Network proactive assurance on THR crossing, Service migration, Profile clean-up</a:t>
+            </a:r>
+            <a:br>
+              <a:rPr lang="en-US" dirty="0">
+                <a:solidFill>
+                  <a:srgbClr val="FF0000"/>
+                </a:solidFill>
+              </a:rPr>
+            </a:br>
+            <a:r>
+              <a:rPr lang="en-US" dirty="0"/>
+              <a:t>--&gt; At IETF: SIMAP, Knowledge Graph, Network Observability, Network Anomaly Detection</a:t>
+            </a:r>
+          </a:p>
+          <a:p>
+            <a:pPr marL="342900" indent="-342900">
+              <a:buFont typeface="Arial" panose="020B0604020202020204" pitchFamily="34" charset="0"/>
+              <a:buChar char="•"/>
+            </a:pPr>
+            <a:r>
+              <a:rPr lang="en-US" dirty="0"/>
+              <a:t>YANG Data Modelling</a:t>
+            </a:r>
+            <a:br>
+              <a:rPr lang="en-US" dirty="0"/>
+            </a:br>
+            <a:r>
+              <a:rPr lang="en-US" dirty="0">
+                <a:solidFill>
+                  <a:srgbClr val="FF0000"/>
+                </a:solidFill>
+              </a:rPr>
+              <a:t>-&gt; </a:t>
+            </a:r>
+            <a:r>
+              <a:rPr lang="en-US" sz="1800" dirty="0">
+                <a:solidFill>
+                  <a:srgbClr val="FF0000"/>
+                </a:solidFill>
+                <a:effectLst/>
+                <a:latin typeface="Trebuchet MS" panose="020B0603020202020204" pitchFamily="34" charset="0"/>
+                <a:ea typeface="Yu Gothic" panose="020B0400000000000000" pitchFamily="34" charset="-128"/>
+                <a:cs typeface="Aptos" panose="020B0004020202020204" pitchFamily="34" charset="0"/>
+              </a:rPr>
+              <a:t>IETF and IANA YANG modules (</a:t>
+            </a:r>
+            <a:r>
+              <a:rPr lang="en-US" sz="1800" dirty="0" err="1">
+                <a:solidFill>
+                  <a:srgbClr val="FF0000"/>
+                </a:solidFill>
+                <a:effectLst/>
+                <a:latin typeface="Trebuchet MS" panose="020B0603020202020204" pitchFamily="34" charset="0"/>
+                <a:ea typeface="Yu Gothic" panose="020B0400000000000000" pitchFamily="34" charset="-128"/>
+                <a:cs typeface="Aptos" panose="020B0004020202020204" pitchFamily="34" charset="0"/>
+              </a:rPr>
+              <a:t>ietf-hardware.yang</a:t>
+            </a:r>
+            <a:r>
+              <a:rPr lang="en-US" sz="1800" dirty="0">
+                <a:solidFill>
+                  <a:srgbClr val="FF0000"/>
+                </a:solidFill>
+                <a:effectLst/>
+                <a:latin typeface="Trebuchet MS" panose="020B0603020202020204" pitchFamily="34" charset="0"/>
+                <a:ea typeface="Yu Gothic" panose="020B0400000000000000" pitchFamily="34" charset="-128"/>
+                <a:cs typeface="Aptos" panose="020B0004020202020204" pitchFamily="34" charset="0"/>
+              </a:rPr>
+              <a:t> </a:t>
+            </a:r>
+            <a:r>
+              <a:rPr lang="en-US" sz="1800" dirty="0" err="1">
+                <a:solidFill>
+                  <a:srgbClr val="FF0000"/>
+                </a:solidFill>
+                <a:effectLst/>
+                <a:latin typeface="Trebuchet MS" panose="020B0603020202020204" pitchFamily="34" charset="0"/>
+                <a:ea typeface="Yu Gothic" panose="020B0400000000000000" pitchFamily="34" charset="-128"/>
+                <a:cs typeface="Aptos" panose="020B0004020202020204" pitchFamily="34" charset="0"/>
+              </a:rPr>
+              <a:t>ietf-interfaces.yang</a:t>
+            </a:r>
+            <a:r>
+              <a:rPr lang="en-US" sz="1800" dirty="0">
+                <a:solidFill>
+                  <a:srgbClr val="FF0000"/>
+                </a:solidFill>
+                <a:effectLst/>
+                <a:latin typeface="Trebuchet MS" panose="020B0603020202020204" pitchFamily="34" charset="0"/>
+                <a:ea typeface="Yu Gothic" panose="020B0400000000000000" pitchFamily="34" charset="-128"/>
+                <a:cs typeface="Aptos" panose="020B0004020202020204" pitchFamily="34" charset="0"/>
+              </a:rPr>
+              <a:t> </a:t>
+            </a:r>
+            <a:r>
+              <a:rPr lang="en-US" sz="1800" dirty="0" err="1">
+                <a:solidFill>
+                  <a:srgbClr val="FF0000"/>
+                </a:solidFill>
+                <a:effectLst/>
+                <a:latin typeface="Trebuchet MS" panose="020B0603020202020204" pitchFamily="34" charset="0"/>
+                <a:ea typeface="Yu Gothic" panose="020B0400000000000000" pitchFamily="34" charset="-128"/>
+                <a:cs typeface="Aptos" panose="020B0004020202020204" pitchFamily="34" charset="0"/>
+              </a:rPr>
+              <a:t>iana-hardware.yang</a:t>
+            </a:r>
+            <a:r>
+              <a:rPr lang="en-US" sz="1800" dirty="0">
+                <a:solidFill>
+                  <a:srgbClr val="FF0000"/>
+                </a:solidFill>
+                <a:effectLst/>
+                <a:latin typeface="Trebuchet MS" panose="020B0603020202020204" pitchFamily="34" charset="0"/>
+                <a:ea typeface="Yu Gothic" panose="020B0400000000000000" pitchFamily="34" charset="-128"/>
+                <a:cs typeface="Aptos" panose="020B0004020202020204" pitchFamily="34" charset="0"/>
+              </a:rPr>
+              <a:t> </a:t>
+            </a:r>
+            <a:r>
+              <a:rPr lang="en-US" sz="1800" dirty="0" err="1">
+                <a:solidFill>
+                  <a:srgbClr val="FF0000"/>
+                </a:solidFill>
+                <a:effectLst/>
+                <a:latin typeface="Trebuchet MS" panose="020B0603020202020204" pitchFamily="34" charset="0"/>
+                <a:ea typeface="Yu Gothic" panose="020B0400000000000000" pitchFamily="34" charset="-128"/>
+                <a:cs typeface="Aptos" panose="020B0004020202020204" pitchFamily="34" charset="0"/>
+              </a:rPr>
+              <a:t>iana</a:t>
+            </a:r>
+            <a:r>
+              <a:rPr lang="en-US" sz="1800" dirty="0">
+                <a:solidFill>
+                  <a:srgbClr val="FF0000"/>
+                </a:solidFill>
+                <a:effectLst/>
+                <a:latin typeface="Trebuchet MS" panose="020B0603020202020204" pitchFamily="34" charset="0"/>
+                <a:ea typeface="Yu Gothic" panose="020B0400000000000000" pitchFamily="34" charset="-128"/>
+                <a:cs typeface="Aptos" panose="020B0004020202020204" pitchFamily="34" charset="0"/>
+              </a:rPr>
+              <a:t>-if-</a:t>
+            </a:r>
+            <a:r>
+              <a:rPr lang="en-US" sz="1800" dirty="0" err="1">
+                <a:solidFill>
+                  <a:srgbClr val="FF0000"/>
+                </a:solidFill>
+                <a:effectLst/>
+                <a:latin typeface="Trebuchet MS" panose="020B0603020202020204" pitchFamily="34" charset="0"/>
+                <a:ea typeface="Yu Gothic" panose="020B0400000000000000" pitchFamily="34" charset="-128"/>
+                <a:cs typeface="Aptos" panose="020B0004020202020204" pitchFamily="34" charset="0"/>
+              </a:rPr>
+              <a:t>type.yang</a:t>
+            </a:r>
+            <a:r>
+              <a:rPr lang="en-US" sz="1800" dirty="0">
+                <a:solidFill>
+                  <a:srgbClr val="FF0000"/>
+                </a:solidFill>
+                <a:effectLst/>
+                <a:latin typeface="Trebuchet MS" panose="020B0603020202020204" pitchFamily="34" charset="0"/>
+                <a:ea typeface="Yu Gothic" panose="020B0400000000000000" pitchFamily="34" charset="-128"/>
+                <a:cs typeface="Aptos" panose="020B0004020202020204" pitchFamily="34" charset="0"/>
+              </a:rPr>
+              <a:t> </a:t>
+            </a:r>
+            <a:r>
+              <a:rPr lang="en-US" sz="1800" dirty="0" err="1">
+                <a:solidFill>
+                  <a:srgbClr val="FF0000"/>
+                </a:solidFill>
+                <a:effectLst/>
+                <a:latin typeface="Trebuchet MS" panose="020B0603020202020204" pitchFamily="34" charset="0"/>
+                <a:ea typeface="Yu Gothic" panose="020B0400000000000000" pitchFamily="34" charset="-128"/>
+                <a:cs typeface="Aptos" panose="020B0004020202020204" pitchFamily="34" charset="0"/>
+              </a:rPr>
+              <a:t>iana</a:t>
+            </a:r>
+            <a:r>
+              <a:rPr lang="en-US" sz="1800" dirty="0">
+                <a:solidFill>
+                  <a:srgbClr val="FF0000"/>
+                </a:solidFill>
+                <a:effectLst/>
+                <a:latin typeface="Trebuchet MS" panose="020B0603020202020204" pitchFamily="34" charset="0"/>
+                <a:ea typeface="Yu Gothic" panose="020B0400000000000000" pitchFamily="34" charset="-128"/>
+                <a:cs typeface="Aptos" panose="020B0004020202020204" pitchFamily="34" charset="0"/>
+              </a:rPr>
+              <a:t>-if-</a:t>
+            </a:r>
+            <a:r>
+              <a:rPr lang="en-US" sz="1800" dirty="0" err="1">
+                <a:solidFill>
+                  <a:srgbClr val="FF0000"/>
+                </a:solidFill>
+                <a:effectLst/>
+                <a:latin typeface="Trebuchet MS" panose="020B0603020202020204" pitchFamily="34" charset="0"/>
+                <a:ea typeface="Yu Gothic" panose="020B0400000000000000" pitchFamily="34" charset="-128"/>
+                <a:cs typeface="Aptos" panose="020B0004020202020204" pitchFamily="34" charset="0"/>
+              </a:rPr>
+              <a:t>type.yang</a:t>
+            </a:r>
+            <a:r>
+              <a:rPr lang="en-US" sz="1800" dirty="0">
+                <a:solidFill>
+                  <a:srgbClr val="FF0000"/>
+                </a:solidFill>
+                <a:effectLst/>
+                <a:latin typeface="Trebuchet MS" panose="020B0603020202020204" pitchFamily="34" charset="0"/>
+                <a:ea typeface="Yu Gothic" panose="020B0400000000000000" pitchFamily="34" charset="-128"/>
+                <a:cs typeface="Aptos" panose="020B0004020202020204" pitchFamily="34" charset="0"/>
+              </a:rPr>
+              <a:t>) and augmented with BBF TR-383 and TR-385 based YANG modules.</a:t>
+            </a:r>
+            <a:endParaRPr lang="en-US" dirty="0">
+              <a:solidFill>
+                <a:srgbClr val="FF0000"/>
+              </a:solidFill>
+            </a:endParaRPr>
           </a:p>
           <a:p>
             <a:pPr marL="342900" indent="-342900">

</xml_diff>